<commit_message>
JAZ FINAL PPT SLIDES
</commit_message>
<xml_diff>
--- a/docs/Presentation/Jaz_Power-Point.pptx
+++ b/docs/Presentation/Jaz_Power-Point.pptx
@@ -5,7 +5,7 @@
     <p:sldMasterId id="2147483864" r:id="rId1"/>
   </p:sldMasterIdLst>
   <p:notesMasterIdLst>
-    <p:notesMasterId r:id="rId17"/>
+    <p:notesMasterId r:id="rId18"/>
   </p:notesMasterIdLst>
   <p:sldIdLst>
     <p:sldId id="256" r:id="rId2"/>
@@ -19,10 +19,11 @@
     <p:sldId id="260" r:id="rId10"/>
     <p:sldId id="268" r:id="rId11"/>
     <p:sldId id="269" r:id="rId12"/>
-    <p:sldId id="271" r:id="rId13"/>
-    <p:sldId id="261" r:id="rId14"/>
-    <p:sldId id="263" r:id="rId15"/>
-    <p:sldId id="264" r:id="rId16"/>
+    <p:sldId id="272" r:id="rId13"/>
+    <p:sldId id="271" r:id="rId14"/>
+    <p:sldId id="261" r:id="rId15"/>
+    <p:sldId id="263" r:id="rId16"/>
+    <p:sldId id="264" r:id="rId17"/>
   </p:sldIdLst>
   <p:sldSz cx="12192000" cy="6858000"/>
   <p:notesSz cx="6858000" cy="9144000"/>
@@ -144,6 +145,53 @@
 <file path=ppt/changesInfos/changesInfo1.xml><?xml version="1.0" encoding="utf-8"?>
 <pc:chgInfo xmlns:a="http://schemas.openxmlformats.org/drawingml/2006/main" xmlns:r="http://schemas.openxmlformats.org/officeDocument/2006/relationships" xmlns:ac="http://schemas.microsoft.com/office/drawing/2013/main/command" xmlns:pc="http://schemas.microsoft.com/office/powerpoint/2013/main/command">
   <pc:docChgLst>
+    <pc:chgData name="Jazlyn Mazick" userId="8a7300819bea6d28" providerId="LiveId" clId="{587A17F5-E34A-493E-B143-B3B0AB7EF446}"/>
+    <pc:docChg chg="undo custSel addSld modSld sldOrd">
+      <pc:chgData name="Jazlyn Mazick" userId="8a7300819bea6d28" providerId="LiveId" clId="{587A17F5-E34A-493E-B143-B3B0AB7EF446}" dt="2020-11-21T06:10:02.161" v="994" actId="20577"/>
+      <pc:docMkLst>
+        <pc:docMk/>
+      </pc:docMkLst>
+      <pc:sldChg chg="modSp mod">
+        <pc:chgData name="Jazlyn Mazick" userId="8a7300819bea6d28" providerId="LiveId" clId="{587A17F5-E34A-493E-B143-B3B0AB7EF446}" dt="2020-11-21T05:30:15.367" v="11" actId="5793"/>
+        <pc:sldMkLst>
+          <pc:docMk/>
+          <pc:sldMk cId="588662976" sldId="266"/>
+        </pc:sldMkLst>
+        <pc:spChg chg="mod">
+          <ac:chgData name="Jazlyn Mazick" userId="8a7300819bea6d28" providerId="LiveId" clId="{587A17F5-E34A-493E-B143-B3B0AB7EF446}" dt="2020-11-21T05:30:15.367" v="11" actId="5793"/>
+          <ac:spMkLst>
+            <pc:docMk/>
+            <pc:sldMk cId="588662976" sldId="266"/>
+            <ac:spMk id="3" creationId="{313AC479-288D-584A-9BC6-605872BAED25}"/>
+          </ac:spMkLst>
+        </pc:spChg>
+      </pc:sldChg>
+      <pc:sldChg chg="modSp new mod ord">
+        <pc:chgData name="Jazlyn Mazick" userId="8a7300819bea6d28" providerId="LiveId" clId="{587A17F5-E34A-493E-B143-B3B0AB7EF446}" dt="2020-11-21T06:10:02.161" v="994" actId="20577"/>
+        <pc:sldMkLst>
+          <pc:docMk/>
+          <pc:sldMk cId="2532724977" sldId="272"/>
+        </pc:sldMkLst>
+        <pc:spChg chg="mod">
+          <ac:chgData name="Jazlyn Mazick" userId="8a7300819bea6d28" providerId="LiveId" clId="{587A17F5-E34A-493E-B143-B3B0AB7EF446}" dt="2020-11-21T05:31:12.326" v="13"/>
+          <ac:spMkLst>
+            <pc:docMk/>
+            <pc:sldMk cId="2532724977" sldId="272"/>
+            <ac:spMk id="2" creationId="{E7E789F8-BF36-492C-BED0-A144976DF42E}"/>
+          </ac:spMkLst>
+        </pc:spChg>
+        <pc:spChg chg="mod">
+          <ac:chgData name="Jazlyn Mazick" userId="8a7300819bea6d28" providerId="LiveId" clId="{587A17F5-E34A-493E-B143-B3B0AB7EF446}" dt="2020-11-21T06:10:02.161" v="994" actId="20577"/>
+          <ac:spMkLst>
+            <pc:docMk/>
+            <pc:sldMk cId="2532724977" sldId="272"/>
+            <ac:spMk id="3" creationId="{97F6E355-8183-47EB-99AC-485B5688F214}"/>
+          </ac:spMkLst>
+        </pc:spChg>
+      </pc:sldChg>
+    </pc:docChg>
+  </pc:docChgLst>
+  <pc:docChgLst>
     <pc:chgData name="Jazlyn Mazick" userId="8a7300819bea6d28" providerId="LiveId" clId="{B89188A5-F536-436A-8978-636A6B30C740}"/>
     <pc:docChg chg="undo custSel addSld modSld sldOrd">
       <pc:chgData name="Jazlyn Mazick" userId="8a7300819bea6d28" providerId="LiveId" clId="{B89188A5-F536-436A-8978-636A6B30C740}" dt="2020-11-21T05:04:51.895" v="779" actId="20577"/>
@@ -623,7 +671,7 @@
           <a:p>
             <a:fld id="{3200698D-BA5E-4C86-8034-8FDEE1AF7ED1}" type="slidenum">
               <a:rPr lang="en-US" smtClean="0"/>
-              <a:t>12</a:t>
+              <a:t>13</a:t>
             </a:fld>
             <a:endParaRPr lang="en-US"/>
           </a:p>
@@ -5888,7 +5936,7 @@
           <p:cNvPr id="2" name="Title 1">
             <a:extLst>
               <a:ext uri="{FF2B5EF4-FFF2-40B4-BE49-F238E27FC236}">
-                <a16:creationId xmlns:a16="http://schemas.microsoft.com/office/drawing/2014/main" id="{4CFF8EA7-56AC-4BC5-A399-4DF1957CD7E9}"/>
+                <a16:creationId xmlns:a16="http://schemas.microsoft.com/office/drawing/2014/main" id="{E7E789F8-BF36-492C-BED0-A144976DF42E}"/>
               </a:ext>
             </a:extLst>
           </p:cNvPr>
@@ -5911,39 +5959,64 @@
           </a:p>
         </p:txBody>
       </p:sp>
-      <p:pic>
-        <p:nvPicPr>
-          <p:cNvPr id="5" name="Content Placeholder 4">
+      <p:sp>
+        <p:nvSpPr>
+          <p:cNvPr id="3" name="Content Placeholder 2">
             <a:extLst>
               <a:ext uri="{FF2B5EF4-FFF2-40B4-BE49-F238E27FC236}">
-                <a16:creationId xmlns:a16="http://schemas.microsoft.com/office/drawing/2014/main" id="{2A1E6EFF-81DA-4127-BD76-B7179B191B03}"/>
+                <a16:creationId xmlns:a16="http://schemas.microsoft.com/office/drawing/2014/main" id="{97F6E355-8183-47EB-99AC-485B5688F214}"/>
               </a:ext>
             </a:extLst>
           </p:cNvPr>
-          <p:cNvPicPr>
-            <a:picLocks noGrp="1" noChangeAspect="1"/>
-          </p:cNvPicPr>
+          <p:cNvSpPr>
+            <a:spLocks noGrp="1"/>
+          </p:cNvSpPr>
           <p:nvPr>
             <p:ph idx="1"/>
           </p:nvPr>
-        </p:nvPicPr>
-        <p:blipFill>
-          <a:blip r:embed="rId3"/>
-          <a:stretch>
-            <a:fillRect/>
-          </a:stretch>
-        </p:blipFill>
-        <p:spPr>
-          <a:xfrm>
-            <a:off x="1836657" y="1885285"/>
-            <a:ext cx="8518686" cy="4439315"/>
-          </a:xfrm>
-        </p:spPr>
-      </p:pic>
+        </p:nvSpPr>
+        <p:spPr/>
+        <p:txBody>
+          <a:bodyPr>
+            <a:normAutofit/>
+          </a:bodyPr>
+          <a:lstStyle/>
+          <a:p>
+            <a:r>
+              <a:rPr lang="en-US" dirty="0"/>
+              <a:t>Low income communities had the highest prevalence of COVID-19</a:t>
+            </a:r>
+          </a:p>
+          <a:p>
+            <a:r>
+              <a:rPr lang="en-US" dirty="0"/>
+              <a:t>COVID cases spiked in July</a:t>
+            </a:r>
+          </a:p>
+          <a:p>
+            <a:r>
+              <a:rPr lang="en-US" dirty="0"/>
+              <a:t>Income categories and unemployment claims</a:t>
+            </a:r>
+          </a:p>
+          <a:p>
+            <a:r>
+              <a:rPr lang="en-US" dirty="0"/>
+              <a:t>Very low income communities had the least reported cases of COVID-19</a:t>
+            </a:r>
+          </a:p>
+          <a:p>
+            <a:endParaRPr lang="en-US" dirty="0"/>
+          </a:p>
+          <a:p>
+            <a:endParaRPr lang="en-US" dirty="0"/>
+          </a:p>
+        </p:txBody>
+      </p:sp>
     </p:spTree>
     <p:extLst>
       <p:ext uri="{BB962C8B-B14F-4D97-AF65-F5344CB8AC3E}">
-        <p14:creationId xmlns:p14="http://schemas.microsoft.com/office/powerpoint/2010/main" val="2907761510"/>
+        <p14:creationId xmlns:p14="http://schemas.microsoft.com/office/powerpoint/2010/main" val="2532724977"/>
       </p:ext>
     </p:extLst>
   </p:cSld>
@@ -5975,7 +6048,7 @@
           <p:cNvPr id="2" name="Title 1">
             <a:extLst>
               <a:ext uri="{FF2B5EF4-FFF2-40B4-BE49-F238E27FC236}">
-                <a16:creationId xmlns:a16="http://schemas.microsoft.com/office/drawing/2014/main" id="{B9C839B7-9D48-4AD3-8ED3-9CEA6F9410C1}"/>
+                <a16:creationId xmlns:a16="http://schemas.microsoft.com/office/drawing/2014/main" id="{4CFF8EA7-56AC-4BC5-A399-4DF1957CD7E9}"/>
               </a:ext>
             </a:extLst>
           </p:cNvPr>
@@ -5993,51 +6066,44 @@
           <a:p>
             <a:r>
               <a:rPr lang="en-US" dirty="0"/>
-              <a:t>Data Analysis</a:t>
+              <a:t>Data Analysis – Income Categories and COVID-19</a:t>
             </a:r>
           </a:p>
         </p:txBody>
       </p:sp>
       <p:pic>
         <p:nvPicPr>
-          <p:cNvPr id="5" name="Google Shape;1915;p131">
+          <p:cNvPr id="5" name="Content Placeholder 4">
             <a:extLst>
               <a:ext uri="{FF2B5EF4-FFF2-40B4-BE49-F238E27FC236}">
-                <a16:creationId xmlns:a16="http://schemas.microsoft.com/office/drawing/2014/main" id="{4CBE7043-AF77-4307-9CCE-D7B607F82B1F}"/>
+                <a16:creationId xmlns:a16="http://schemas.microsoft.com/office/drawing/2014/main" id="{2A1E6EFF-81DA-4127-BD76-B7179B191B03}"/>
               </a:ext>
             </a:extLst>
           </p:cNvPr>
-          <p:cNvPicPr preferRelativeResize="0">
-            <a:picLocks noGrp="1"/>
+          <p:cNvPicPr>
+            <a:picLocks noGrp="1" noChangeAspect="1"/>
           </p:cNvPicPr>
           <p:nvPr>
             <p:ph idx="1"/>
           </p:nvPr>
         </p:nvPicPr>
-        <p:blipFill rotWithShape="1">
-          <a:blip r:embed="rId2">
-            <a:alphaModFix/>
-          </a:blip>
-          <a:stretch/>
+        <p:blipFill>
+          <a:blip r:embed="rId3"/>
+          <a:stretch>
+            <a:fillRect/>
+          </a:stretch>
         </p:blipFill>
         <p:spPr>
           <a:xfrm>
-            <a:off x="3013869" y="2139950"/>
-            <a:ext cx="7315200" cy="3822700"/>
-          </a:xfrm>
-          <a:prstGeom prst="rect">
-            <a:avLst/>
-          </a:prstGeom>
-          <a:noFill/>
-          <a:ln>
-            <a:noFill/>
-          </a:ln>
+            <a:off x="1836657" y="1885285"/>
+            <a:ext cx="8518686" cy="4439315"/>
+          </a:xfrm>
         </p:spPr>
       </p:pic>
     </p:spTree>
     <p:extLst>
       <p:ext uri="{BB962C8B-B14F-4D97-AF65-F5344CB8AC3E}">
-        <p14:creationId xmlns:p14="http://schemas.microsoft.com/office/powerpoint/2010/main" val="4221138102"/>
+        <p14:creationId xmlns:p14="http://schemas.microsoft.com/office/powerpoint/2010/main" val="2907761510"/>
       </p:ext>
     </p:extLst>
   </p:cSld>
@@ -6069,6 +6135,100 @@
           <p:cNvPr id="2" name="Title 1">
             <a:extLst>
               <a:ext uri="{FF2B5EF4-FFF2-40B4-BE49-F238E27FC236}">
+                <a16:creationId xmlns:a16="http://schemas.microsoft.com/office/drawing/2014/main" id="{B9C839B7-9D48-4AD3-8ED3-9CEA6F9410C1}"/>
+              </a:ext>
+            </a:extLst>
+          </p:cNvPr>
+          <p:cNvSpPr>
+            <a:spLocks noGrp="1"/>
+          </p:cNvSpPr>
+          <p:nvPr>
+            <p:ph type="title"/>
+          </p:nvPr>
+        </p:nvSpPr>
+        <p:spPr/>
+        <p:txBody>
+          <a:bodyPr/>
+          <a:lstStyle/>
+          <a:p>
+            <a:r>
+              <a:rPr lang="en-US" dirty="0"/>
+              <a:t>Data Analysis</a:t>
+            </a:r>
+          </a:p>
+        </p:txBody>
+      </p:sp>
+      <p:pic>
+        <p:nvPicPr>
+          <p:cNvPr id="5" name="Google Shape;1915;p131">
+            <a:extLst>
+              <a:ext uri="{FF2B5EF4-FFF2-40B4-BE49-F238E27FC236}">
+                <a16:creationId xmlns:a16="http://schemas.microsoft.com/office/drawing/2014/main" id="{4CBE7043-AF77-4307-9CCE-D7B607F82B1F}"/>
+              </a:ext>
+            </a:extLst>
+          </p:cNvPr>
+          <p:cNvPicPr preferRelativeResize="0">
+            <a:picLocks noGrp="1"/>
+          </p:cNvPicPr>
+          <p:nvPr>
+            <p:ph idx="1"/>
+          </p:nvPr>
+        </p:nvPicPr>
+        <p:blipFill rotWithShape="1">
+          <a:blip r:embed="rId2">
+            <a:alphaModFix/>
+          </a:blip>
+          <a:stretch/>
+        </p:blipFill>
+        <p:spPr>
+          <a:xfrm>
+            <a:off x="3013869" y="2139950"/>
+            <a:ext cx="7315200" cy="3822700"/>
+          </a:xfrm>
+          <a:prstGeom prst="rect">
+            <a:avLst/>
+          </a:prstGeom>
+          <a:noFill/>
+          <a:ln>
+            <a:noFill/>
+          </a:ln>
+        </p:spPr>
+      </p:pic>
+    </p:spTree>
+    <p:extLst>
+      <p:ext uri="{BB962C8B-B14F-4D97-AF65-F5344CB8AC3E}">
+        <p14:creationId xmlns:p14="http://schemas.microsoft.com/office/powerpoint/2010/main" val="4221138102"/>
+      </p:ext>
+    </p:extLst>
+  </p:cSld>
+  <p:clrMapOvr>
+    <a:masterClrMapping/>
+  </p:clrMapOvr>
+</p:sld>
+</file>
+
+<file path=ppt/slides/slide15.xml><?xml version="1.0" encoding="utf-8"?>
+<p:sld xmlns:a="http://schemas.openxmlformats.org/drawingml/2006/main" xmlns:r="http://schemas.openxmlformats.org/officeDocument/2006/relationships" xmlns:p="http://schemas.openxmlformats.org/presentationml/2006/main">
+  <p:cSld>
+    <p:spTree>
+      <p:nvGrpSpPr>
+        <p:cNvPr id="1" name=""/>
+        <p:cNvGrpSpPr/>
+        <p:nvPr/>
+      </p:nvGrpSpPr>
+      <p:grpSpPr>
+        <a:xfrm>
+          <a:off x="0" y="0"/>
+          <a:ext cx="0" cy="0"/>
+          <a:chOff x="0" y="0"/>
+          <a:chExt cx="0" cy="0"/>
+        </a:xfrm>
+      </p:grpSpPr>
+      <p:sp>
+        <p:nvSpPr>
+          <p:cNvPr id="2" name="Title 1">
+            <a:extLst>
+              <a:ext uri="{FF2B5EF4-FFF2-40B4-BE49-F238E27FC236}">
                 <a16:creationId xmlns:a16="http://schemas.microsoft.com/office/drawing/2014/main" id="{45F82BE7-D38C-45DC-9570-D7C34815907C}"/>
               </a:ext>
             </a:extLst>
@@ -6166,7 +6326,7 @@
 </p:sld>
 </file>
 
-<file path=ppt/slides/slide15.xml><?xml version="1.0" encoding="utf-8"?>
+<file path=ppt/slides/slide16.xml><?xml version="1.0" encoding="utf-8"?>
 <p:sld xmlns:a="http://schemas.openxmlformats.org/drawingml/2006/main" xmlns:r="http://schemas.openxmlformats.org/officeDocument/2006/relationships" xmlns:p="http://schemas.openxmlformats.org/presentationml/2006/main">
   <p:cSld>
     <p:spTree>
@@ -7426,6 +7586,12 @@
         <p:txBody>
           <a:bodyPr/>
           <a:lstStyle/>
+          <a:p>
+            <a:r>
+              <a:rPr lang="en-US" dirty="0"/>
+              <a:t>Timeseries</a:t>
+            </a:r>
+          </a:p>
           <a:p>
             <a:endParaRPr lang="en-US" dirty="0"/>
           </a:p>

</xml_diff>